<commit_message>
updated ppt with revision from AntonioJesus
</commit_message>
<xml_diff>
--- a/src/JAMstack.pptx
+++ b/src/JAMstack.pptx
@@ -222,7 +222,7 @@
   <pc:docChgLst>
     <pc:chgData name="Friedel Robert Edward" userId="a8d7f502-641f-415a-9fc5-1ea274487045" providerId="ADAL" clId="{2BE1EA57-A933-4F1F-A012-4221E8DCC85A}"/>
     <pc:docChg chg="undo custSel addSld delSld modSld modSection">
-      <pc:chgData name="Friedel Robert Edward" userId="a8d7f502-641f-415a-9fc5-1ea274487045" providerId="ADAL" clId="{2BE1EA57-A933-4F1F-A012-4221E8DCC85A}" dt="2023-03-02T17:51:18.036" v="4207" actId="20577"/>
+      <pc:chgData name="Friedel Robert Edward" userId="a8d7f502-641f-415a-9fc5-1ea274487045" providerId="ADAL" clId="{2BE1EA57-A933-4F1F-A012-4221E8DCC85A}" dt="2023-03-03T08:45:57.042" v="4434" actId="20577"/>
       <pc:docMkLst>
         <pc:docMk/>
       </pc:docMkLst>
@@ -352,7 +352,7 @@
         </pc:graphicFrameChg>
       </pc:sldChg>
       <pc:sldChg chg="addSp delSp modSp add modNotesTx">
-        <pc:chgData name="Friedel Robert Edward" userId="a8d7f502-641f-415a-9fc5-1ea274487045" providerId="ADAL" clId="{2BE1EA57-A933-4F1F-A012-4221E8DCC85A}" dt="2023-03-02T17:27:58.749" v="3531" actId="20577"/>
+        <pc:chgData name="Friedel Robert Edward" userId="a8d7f502-641f-415a-9fc5-1ea274487045" providerId="ADAL" clId="{2BE1EA57-A933-4F1F-A012-4221E8DCC85A}" dt="2023-03-02T20:46:50.320" v="4424" actId="20577"/>
         <pc:sldMkLst>
           <pc:docMk/>
           <pc:sldMk cId="3870381351" sldId="277"/>
@@ -438,7 +438,7 @@
           </ac:spMkLst>
         </pc:spChg>
         <pc:spChg chg="add mod">
-          <ac:chgData name="Friedel Robert Edward" userId="a8d7f502-641f-415a-9fc5-1ea274487045" providerId="ADAL" clId="{2BE1EA57-A933-4F1F-A012-4221E8DCC85A}" dt="2023-03-02T16:59:57.961" v="3190" actId="20577"/>
+          <ac:chgData name="Friedel Robert Edward" userId="a8d7f502-641f-415a-9fc5-1ea274487045" providerId="ADAL" clId="{2BE1EA57-A933-4F1F-A012-4221E8DCC85A}" dt="2023-03-02T20:46:50.320" v="4424" actId="20577"/>
           <ac:spMkLst>
             <pc:docMk/>
             <pc:sldMk cId="3870381351" sldId="277"/>
@@ -447,13 +447,13 @@
         </pc:spChg>
       </pc:sldChg>
       <pc:sldChg chg="addSp delSp modSp add modNotesTx">
-        <pc:chgData name="Friedel Robert Edward" userId="a8d7f502-641f-415a-9fc5-1ea274487045" providerId="ADAL" clId="{2BE1EA57-A933-4F1F-A012-4221E8DCC85A}" dt="2023-03-02T17:51:18.036" v="4207" actId="20577"/>
+        <pc:chgData name="Friedel Robert Edward" userId="a8d7f502-641f-415a-9fc5-1ea274487045" providerId="ADAL" clId="{2BE1EA57-A933-4F1F-A012-4221E8DCC85A}" dt="2023-03-02T20:51:15.541" v="4431" actId="20577"/>
         <pc:sldMkLst>
           <pc:docMk/>
           <pc:sldMk cId="2605133650" sldId="278"/>
         </pc:sldMkLst>
         <pc:spChg chg="mod">
-          <ac:chgData name="Friedel Robert Edward" userId="a8d7f502-641f-415a-9fc5-1ea274487045" providerId="ADAL" clId="{2BE1EA57-A933-4F1F-A012-4221E8DCC85A}" dt="2023-03-02T15:28:24.698" v="1213" actId="20577"/>
+          <ac:chgData name="Friedel Robert Edward" userId="a8d7f502-641f-415a-9fc5-1ea274487045" providerId="ADAL" clId="{2BE1EA57-A933-4F1F-A012-4221E8DCC85A}" dt="2023-03-02T20:51:15.541" v="4431" actId="20577"/>
           <ac:spMkLst>
             <pc:docMk/>
             <pc:sldMk cId="2605133650" sldId="278"/>
@@ -706,14 +706,14 @@
           <pc:sldMk cId="73465188" sldId="281"/>
         </pc:sldMkLst>
       </pc:sldChg>
-      <pc:sldChg chg="addSp modSp add">
-        <pc:chgData name="Friedel Robert Edward" userId="a8d7f502-641f-415a-9fc5-1ea274487045" providerId="ADAL" clId="{2BE1EA57-A933-4F1F-A012-4221E8DCC85A}" dt="2023-03-02T17:02:37.183" v="3257" actId="14100"/>
+      <pc:sldChg chg="addSp modSp add modNotesTx">
+        <pc:chgData name="Friedel Robert Edward" userId="a8d7f502-641f-415a-9fc5-1ea274487045" providerId="ADAL" clId="{2BE1EA57-A933-4F1F-A012-4221E8DCC85A}" dt="2023-03-03T08:45:57.042" v="4434" actId="20577"/>
         <pc:sldMkLst>
           <pc:docMk/>
           <pc:sldMk cId="3738709459" sldId="282"/>
         </pc:sldMkLst>
         <pc:spChg chg="mod">
-          <ac:chgData name="Friedel Robert Edward" userId="a8d7f502-641f-415a-9fc5-1ea274487045" providerId="ADAL" clId="{2BE1EA57-A933-4F1F-A012-4221E8DCC85A}" dt="2023-03-02T16:23:00.671" v="2526" actId="20577"/>
+          <ac:chgData name="Friedel Robert Edward" userId="a8d7f502-641f-415a-9fc5-1ea274487045" providerId="ADAL" clId="{2BE1EA57-A933-4F1F-A012-4221E8DCC85A}" dt="2023-03-03T08:45:57.042" v="4434" actId="20577"/>
           <ac:spMkLst>
             <pc:docMk/>
             <pc:sldMk cId="3738709459" sldId="282"/>
@@ -745,7 +745,7 @@
           </ac:spMkLst>
         </pc:spChg>
         <pc:spChg chg="add mod">
-          <ac:chgData name="Friedel Robert Edward" userId="a8d7f502-641f-415a-9fc5-1ea274487045" providerId="ADAL" clId="{2BE1EA57-A933-4F1F-A012-4221E8DCC85A}" dt="2023-03-02T17:02:37.183" v="3257" actId="14100"/>
+          <ac:chgData name="Friedel Robert Edward" userId="a8d7f502-641f-415a-9fc5-1ea274487045" providerId="ADAL" clId="{2BE1EA57-A933-4F1F-A012-4221E8DCC85A}" dt="2023-03-02T20:59:18.167" v="4432" actId="14100"/>
           <ac:spMkLst>
             <pc:docMk/>
             <pc:sldMk cId="3738709459" sldId="282"/>
@@ -754,13 +754,13 @@
         </pc:spChg>
       </pc:sldChg>
       <pc:sldChg chg="addSp delSp modSp add modNotesTx">
-        <pc:chgData name="Friedel Robert Edward" userId="a8d7f502-641f-415a-9fc5-1ea274487045" providerId="ADAL" clId="{2BE1EA57-A933-4F1F-A012-4221E8DCC85A}" dt="2023-03-02T17:38:40.547" v="4013" actId="20577"/>
+        <pc:chgData name="Friedel Robert Edward" userId="a8d7f502-641f-415a-9fc5-1ea274487045" providerId="ADAL" clId="{2BE1EA57-A933-4F1F-A012-4221E8DCC85A}" dt="2023-03-03T08:45:30.667" v="4433" actId="20577"/>
         <pc:sldMkLst>
           <pc:docMk/>
           <pc:sldMk cId="370720473" sldId="283"/>
         </pc:sldMkLst>
         <pc:spChg chg="mod">
-          <ac:chgData name="Friedel Robert Edward" userId="a8d7f502-641f-415a-9fc5-1ea274487045" providerId="ADAL" clId="{2BE1EA57-A933-4F1F-A012-4221E8DCC85A}" dt="2023-03-02T17:00:27.401" v="3194" actId="20577"/>
+          <ac:chgData name="Friedel Robert Edward" userId="a8d7f502-641f-415a-9fc5-1ea274487045" providerId="ADAL" clId="{2BE1EA57-A933-4F1F-A012-4221E8DCC85A}" dt="2023-03-03T08:45:30.667" v="4433" actId="20577"/>
           <ac:spMkLst>
             <pc:docMk/>
             <pc:sldMk cId="370720473" sldId="283"/>
@@ -768,7 +768,7 @@
           </ac:spMkLst>
         </pc:spChg>
         <pc:spChg chg="mod">
-          <ac:chgData name="Friedel Robert Edward" userId="a8d7f502-641f-415a-9fc5-1ea274487045" providerId="ADAL" clId="{2BE1EA57-A933-4F1F-A012-4221E8DCC85A}" dt="2023-03-02T17:00:25.926" v="3193" actId="20577"/>
+          <ac:chgData name="Friedel Robert Edward" userId="a8d7f502-641f-415a-9fc5-1ea274487045" providerId="ADAL" clId="{2BE1EA57-A933-4F1F-A012-4221E8DCC85A}" dt="2023-03-02T20:08:03.394" v="4321" actId="1036"/>
           <ac:spMkLst>
             <pc:docMk/>
             <pc:sldMk cId="370720473" sldId="283"/>
@@ -776,7 +776,7 @@
           </ac:spMkLst>
         </pc:spChg>
         <pc:spChg chg="mod">
-          <ac:chgData name="Friedel Robert Edward" userId="a8d7f502-641f-415a-9fc5-1ea274487045" providerId="ADAL" clId="{2BE1EA57-A933-4F1F-A012-4221E8DCC85A}" dt="2023-03-02T17:00:24.591" v="3192" actId="20577"/>
+          <ac:chgData name="Friedel Robert Edward" userId="a8d7f502-641f-415a-9fc5-1ea274487045" providerId="ADAL" clId="{2BE1EA57-A933-4F1F-A012-4221E8DCC85A}" dt="2023-03-02T20:08:03.394" v="4321" actId="1036"/>
           <ac:spMkLst>
             <pc:docMk/>
             <pc:sldMk cId="370720473" sldId="283"/>
@@ -800,6 +800,14 @@
           </ac:spMkLst>
         </pc:spChg>
         <pc:spChg chg="add del mod">
+          <ac:chgData name="Friedel Robert Edward" userId="a8d7f502-641f-415a-9fc5-1ea274487045" providerId="ADAL" clId="{2BE1EA57-A933-4F1F-A012-4221E8DCC85A}" dt="2023-03-02T20:06:50.642" v="4284"/>
+          <ac:spMkLst>
+            <pc:docMk/>
+            <pc:sldMk cId="370720473" sldId="283"/>
+            <ac:spMk id="8" creationId="{BC2EE139-2BA6-4B03-9A15-013F26FDA26B}"/>
+          </ac:spMkLst>
+        </pc:spChg>
+        <pc:spChg chg="add del mod">
           <ac:chgData name="Friedel Robert Edward" userId="a8d7f502-641f-415a-9fc5-1ea274487045" providerId="ADAL" clId="{2BE1EA57-A933-4F1F-A012-4221E8DCC85A}" dt="2023-03-02T16:25:29.652" v="2546" actId="478"/>
           <ac:spMkLst>
             <pc:docMk/>
@@ -808,11 +816,27 @@
           </ac:spMkLst>
         </pc:spChg>
         <pc:spChg chg="add mod">
-          <ac:chgData name="Friedel Robert Edward" userId="a8d7f502-641f-415a-9fc5-1ea274487045" providerId="ADAL" clId="{2BE1EA57-A933-4F1F-A012-4221E8DCC85A}" dt="2023-03-02T16:33:13.873" v="3021" actId="20577"/>
+          <ac:chgData name="Friedel Robert Edward" userId="a8d7f502-641f-415a-9fc5-1ea274487045" providerId="ADAL" clId="{2BE1EA57-A933-4F1F-A012-4221E8DCC85A}" dt="2023-03-02T20:08:19.372" v="4323" actId="14100"/>
+          <ac:spMkLst>
+            <pc:docMk/>
+            <pc:sldMk cId="370720473" sldId="283"/>
+            <ac:spMk id="9" creationId="{EF450983-7B3A-4EE5-AA02-711ED14DDE02}"/>
+          </ac:spMkLst>
+        </pc:spChg>
+        <pc:spChg chg="add mod">
+          <ac:chgData name="Friedel Robert Edward" userId="a8d7f502-641f-415a-9fc5-1ea274487045" providerId="ADAL" clId="{2BE1EA57-A933-4F1F-A012-4221E8DCC85A}" dt="2023-03-02T20:08:03.394" v="4321" actId="1036"/>
           <ac:spMkLst>
             <pc:docMk/>
             <pc:sldMk cId="370720473" sldId="283"/>
             <ac:spMk id="10" creationId="{AC556B4B-0EE5-4197-8451-775150931A3B}"/>
+          </ac:spMkLst>
+        </pc:spChg>
+        <pc:spChg chg="add del mod">
+          <ac:chgData name="Friedel Robert Edward" userId="a8d7f502-641f-415a-9fc5-1ea274487045" providerId="ADAL" clId="{2BE1EA57-A933-4F1F-A012-4221E8DCC85A}" dt="2023-03-02T20:06:47.895" v="4279"/>
+          <ac:spMkLst>
+            <pc:docMk/>
+            <pc:sldMk cId="370720473" sldId="283"/>
+            <ac:spMk id="11" creationId="{C9816DC1-5F23-4628-9135-70C891BFBD76}"/>
           </ac:spMkLst>
         </pc:spChg>
       </pc:sldChg>
@@ -984,7 +1008,7 @@
               <a:rPr lang="en-US">
                 <a:latin typeface="MetricHPE" panose="020B0503030202060203" pitchFamily="34" charset="0"/>
               </a:rPr>
-              <a:t>3/2/2023</a:t>
+              <a:t>3/3/2023</a:t>
             </a:fld>
             <a:endParaRPr dirty="0">
               <a:latin typeface="MetricHPE" panose="020B0503030202060203" pitchFamily="34" charset="0"/>
@@ -2094,7 +2118,15 @@
             </a:r>
             <a:r>
               <a:rPr lang="es-ES" dirty="0"/>
-              <a:t> </a:t>
+              <a:t> in </a:t>
+            </a:r>
+            <a:r>
+              <a:rPr lang="es-ES" dirty="0" err="1"/>
+              <a:t>detail</a:t>
+            </a:r>
+            <a:r>
+              <a:rPr lang="es-ES" dirty="0"/>
+              <a:t>, </a:t>
             </a:r>
             <a:r>
               <a:rPr lang="es-ES" dirty="0" err="1"/>
@@ -2116,6 +2148,14 @@
               <a:rPr lang="es-ES" dirty="0" err="1"/>
               <a:t>diferences</a:t>
             </a:r>
+            <a:r>
+              <a:rPr lang="es-ES" dirty="0"/>
+              <a:t> and </a:t>
+            </a:r>
+            <a:r>
+              <a:rPr lang="es-ES" dirty="0" err="1"/>
+              <a:t>tendency</a:t>
+            </a:r>
             <a:endParaRPr lang="es-ES" dirty="0"/>
           </a:p>
           <a:p>
@@ -2149,7 +2189,7 @@
             </a:r>
             <a:r>
               <a:rPr lang="es-ES" dirty="0" err="1"/>
-              <a:t>conent</a:t>
+              <a:t>content</a:t>
             </a:r>
             <a:r>
               <a:rPr lang="es-ES" dirty="0"/>
@@ -2254,6 +2294,173 @@
 </file>
 
 <file path=ppt/notesSlides/notesSlide4.xml><?xml version="1.0" encoding="utf-8"?>
+<p:notes xmlns:a="http://schemas.openxmlformats.org/drawingml/2006/main" xmlns:r="http://schemas.openxmlformats.org/officeDocument/2006/relationships" xmlns:p="http://schemas.openxmlformats.org/presentationml/2006/main">
+  <p:cSld>
+    <p:spTree>
+      <p:nvGrpSpPr>
+        <p:cNvPr id="1" name=""/>
+        <p:cNvGrpSpPr/>
+        <p:nvPr/>
+      </p:nvGrpSpPr>
+      <p:grpSpPr>
+        <a:xfrm>
+          <a:off x="0" y="0"/>
+          <a:ext cx="0" cy="0"/>
+          <a:chOff x="0" y="0"/>
+          <a:chExt cx="0" cy="0"/>
+        </a:xfrm>
+      </p:grpSpPr>
+      <p:sp>
+        <p:nvSpPr>
+          <p:cNvPr id="2" name="Slide Image Placeholder 1"/>
+          <p:cNvSpPr>
+            <a:spLocks noGrp="1" noRot="1" noChangeAspect="1"/>
+          </p:cNvSpPr>
+          <p:nvPr>
+            <p:ph type="sldImg"/>
+          </p:nvPr>
+        </p:nvSpPr>
+        <p:spPr>
+          <a:xfrm>
+            <a:off x="381000" y="381000"/>
+            <a:ext cx="4572000" cy="2573338"/>
+          </a:xfrm>
+        </p:spPr>
+      </p:sp>
+      <p:sp>
+        <p:nvSpPr>
+          <p:cNvPr id="3" name="Notes Placeholder 2"/>
+          <p:cNvSpPr>
+            <a:spLocks noGrp="1"/>
+          </p:cNvSpPr>
+          <p:nvPr>
+            <p:ph type="body" idx="1"/>
+          </p:nvPr>
+        </p:nvSpPr>
+        <p:spPr/>
+        <p:txBody>
+          <a:bodyPr/>
+          <a:lstStyle/>
+          <a:p>
+            <a:r>
+              <a:rPr lang="es-ES" dirty="0"/>
+              <a:t>SSG </a:t>
+            </a:r>
+            <a:r>
+              <a:rPr lang="es-ES" dirty="0" err="1"/>
+              <a:t>is</a:t>
+            </a:r>
+            <a:r>
+              <a:rPr lang="es-ES" dirty="0"/>
+              <a:t> </a:t>
+            </a:r>
+            <a:r>
+              <a:rPr lang="es-ES" dirty="0" err="1"/>
+              <a:t>the</a:t>
+            </a:r>
+            <a:r>
+              <a:rPr lang="es-ES" dirty="0"/>
+              <a:t> </a:t>
+            </a:r>
+            <a:r>
+              <a:rPr lang="es-ES" dirty="0" err="1"/>
+              <a:t>compiled</a:t>
+            </a:r>
+            <a:r>
+              <a:rPr lang="es-ES" dirty="0"/>
+              <a:t> </a:t>
+            </a:r>
+            <a:r>
+              <a:rPr lang="es-ES" dirty="0" err="1"/>
+              <a:t>stuff</a:t>
+            </a:r>
+            <a:r>
+              <a:rPr lang="es-ES" dirty="0"/>
+              <a:t> </a:t>
+            </a:r>
+            <a:r>
+              <a:rPr lang="es-ES" dirty="0" err="1"/>
+              <a:t>from</a:t>
+            </a:r>
+            <a:r>
+              <a:rPr lang="es-ES" dirty="0"/>
+              <a:t> </a:t>
+            </a:r>
+            <a:r>
+              <a:rPr lang="es-ES" dirty="0" err="1"/>
+              <a:t>before</a:t>
+            </a:r>
+            <a:endParaRPr lang="es-ES" dirty="0"/>
+          </a:p>
+          <a:p>
+            <a:endParaRPr lang="es-ES" dirty="0"/>
+          </a:p>
+          <a:p>
+            <a:r>
+              <a:rPr lang="es-ES" dirty="0" err="1"/>
+              <a:t>Runtime</a:t>
+            </a:r>
+            <a:r>
+              <a:rPr lang="es-ES" dirty="0"/>
+              <a:t> </a:t>
+            </a:r>
+            <a:r>
+              <a:rPr lang="es-ES" dirty="0" err="1"/>
+              <a:t>runtime</a:t>
+            </a:r>
+            <a:r>
+              <a:rPr lang="es-ES" dirty="0"/>
+              <a:t> </a:t>
+            </a:r>
+            <a:r>
+              <a:rPr lang="es-ES" dirty="0" err="1"/>
+              <a:t>buildtime</a:t>
+            </a:r>
+            <a:r>
+              <a:rPr lang="es-ES" dirty="0"/>
+              <a:t>!!</a:t>
+            </a:r>
+          </a:p>
+        </p:txBody>
+      </p:sp>
+      <p:sp>
+        <p:nvSpPr>
+          <p:cNvPr id="4" name="Slide Number Placeholder 3"/>
+          <p:cNvSpPr>
+            <a:spLocks noGrp="1"/>
+          </p:cNvSpPr>
+          <p:nvPr>
+            <p:ph type="sldNum" sz="quarter" idx="5"/>
+          </p:nvPr>
+        </p:nvSpPr>
+        <p:spPr/>
+        <p:txBody>
+          <a:bodyPr/>
+          <a:lstStyle/>
+          <a:p>
+            <a:fld id="{5BFEAE42-E3FE-4405-B7FC-4425D05B92A0}" type="slidenum">
+              <a:rPr lang="en-US" smtClean="0"/>
+              <a:pPr/>
+              <a:t>5</a:t>
+            </a:fld>
+            <a:endParaRPr lang="en-US" dirty="0"/>
+          </a:p>
+        </p:txBody>
+      </p:sp>
+    </p:spTree>
+    <p:extLst>
+      <p:ext uri="{BB962C8B-B14F-4D97-AF65-F5344CB8AC3E}">
+        <p14:creationId xmlns:p14="http://schemas.microsoft.com/office/powerpoint/2010/main" val="3273518826"/>
+      </p:ext>
+    </p:extLst>
+  </p:cSld>
+  <p:clrMapOvr>
+    <a:masterClrMapping/>
+  </p:clrMapOvr>
+</p:notes>
+</file>
+
+<file path=ppt/notesSlides/notesSlide5.xml><?xml version="1.0" encoding="utf-8"?>
 <p:notes xmlns:a="http://schemas.openxmlformats.org/drawingml/2006/main" xmlns:r="http://schemas.openxmlformats.org/officeDocument/2006/relationships" xmlns:p="http://schemas.openxmlformats.org/presentationml/2006/main">
   <p:cSld>
     <p:spTree>
@@ -2851,7 +3058,7 @@
             </a:ln>
             <a:extLst>
               <a:ext uri="{91240B29-F687-4f45-9708-019B960494DF}">
-                <a14:hiddenLine xmlns="" xmlns:a14="http://schemas.microsoft.com/office/drawing/2010/main" w="9525">
+                <a14:hiddenLine xmlns:a14="http://schemas.microsoft.com/office/drawing/2010/main" xmlns="" w="9525">
                   <a:solidFill>
                     <a:srgbClr val="000000"/>
                   </a:solidFill>
@@ -4919,7 +5126,7 @@
             </a:ln>
             <a:extLst>
               <a:ext uri="{91240B29-F687-4f45-9708-019B960494DF}">
-                <a14:hiddenLine xmlns="" xmlns:a14="http://schemas.microsoft.com/office/drawing/2010/main" w="9525">
+                <a14:hiddenLine xmlns:a14="http://schemas.microsoft.com/office/drawing/2010/main" xmlns="" w="9525">
                   <a:solidFill>
                     <a:srgbClr val="000000"/>
                   </a:solidFill>
@@ -9283,7 +9490,7 @@
             </a:ln>
             <a:extLst>
               <a:ext uri="{91240B29-F687-4f45-9708-019B960494DF}">
-                <a14:hiddenLine xmlns="" xmlns:a14="http://schemas.microsoft.com/office/drawing/2010/main" w="9525">
+                <a14:hiddenLine xmlns:a14="http://schemas.microsoft.com/office/drawing/2010/main" xmlns="" w="9525">
                   <a:solidFill>
                     <a:srgbClr val="000000"/>
                   </a:solidFill>
@@ -11351,7 +11558,7 @@
             </a:ln>
             <a:extLst>
               <a:ext uri="{91240B29-F687-4f45-9708-019B960494DF}">
-                <a14:hiddenLine xmlns="" xmlns:a14="http://schemas.microsoft.com/office/drawing/2010/main" w="9525">
+                <a14:hiddenLine xmlns:a14="http://schemas.microsoft.com/office/drawing/2010/main" xmlns="" w="9525">
                   <a:solidFill>
                     <a:srgbClr val="000000"/>
                   </a:solidFill>
@@ -15690,7 +15897,7 @@
             </a:ln>
             <a:extLst>
               <a:ext uri="{91240B29-F687-4f45-9708-019B960494DF}">
-                <a14:hiddenLine xmlns="" xmlns:a14="http://schemas.microsoft.com/office/drawing/2010/main" w="9525">
+                <a14:hiddenLine xmlns:a14="http://schemas.microsoft.com/office/drawing/2010/main" xmlns="" w="9525">
                   <a:solidFill>
                     <a:srgbClr val="000000"/>
                   </a:solidFill>
@@ -17752,7 +17959,7 @@
             </a:ln>
             <a:extLst>
               <a:ext uri="{91240B29-F687-4f45-9708-019B960494DF}">
-                <a14:hiddenLine xmlns="" xmlns:a14="http://schemas.microsoft.com/office/drawing/2010/main" w="9525">
+                <a14:hiddenLine xmlns:a14="http://schemas.microsoft.com/office/drawing/2010/main" xmlns="" w="9525">
                   <a:solidFill>
                     <a:srgbClr val="000000"/>
                   </a:solidFill>
@@ -28077,7 +28284,7 @@
             </a:r>
             <a:r>
               <a:rPr lang="es-ES" dirty="0" err="1"/>
-              <a:t>stack</a:t>
+              <a:t>stacks</a:t>
             </a:r>
             <a:r>
               <a:rPr lang="es-ES" dirty="0"/>
@@ -28121,6 +28328,13 @@
               <a:buFontTx/>
               <a:buChar char="-"/>
             </a:pPr>
+            <a:endParaRPr lang="es-ES" dirty="0"/>
+          </a:p>
+          <a:p>
+            <a:pPr marL="457200" indent="-457200">
+              <a:buFontTx/>
+              <a:buChar char="-"/>
+            </a:pPr>
             <a:r>
               <a:rPr lang="es-ES" dirty="0" err="1"/>
               <a:t>According</a:t>
@@ -28172,12 +28386,16 @@
               <a:t> is an </a:t>
             </a:r>
             <a:r>
-              <a:rPr lang="en-US" sz="2000" i="1" u="sng" dirty="0"/>
+              <a:rPr lang="en-US" sz="2000" b="1" i="1" u="sng" dirty="0"/>
               <a:t>architectural approach</a:t>
             </a:r>
             <a:r>
+              <a:rPr lang="en-US" sz="2000" b="1" i="1" dirty="0"/>
+              <a:t> </a:t>
+            </a:r>
+            <a:r>
               <a:rPr lang="en-US" sz="2000" i="1" dirty="0"/>
-              <a:t> that decouples the web experience layer from data and business logic, improving flexibility, scalability, performance, and maintainability. </a:t>
+              <a:t>that decouples the web experience layer from data and business logic, improving flexibility, scalability, performance, and maintainability. </a:t>
             </a:r>
             <a:r>
               <a:rPr lang="en-US" sz="2000" i="1" dirty="0" err="1"/>
@@ -28199,20 +28417,6 @@
               <a:rPr lang="en-US" i="1" dirty="0"/>
               <a:t>”</a:t>
             </a:r>
-          </a:p>
-          <a:p>
-            <a:endParaRPr lang="en-US" i="1" dirty="0"/>
-          </a:p>
-          <a:p>
-            <a:r>
-              <a:rPr lang="en-US" dirty="0"/>
-              <a:t>-     What </a:t>
-            </a:r>
-            <a:r>
-              <a:rPr lang="en-US" i="1" dirty="0"/>
-              <a:t>is JAM? Stands for JavaScript, APIs and Markdown (compiled).</a:t>
-            </a:r>
-            <a:endParaRPr lang="es-ES" dirty="0"/>
           </a:p>
         </p:txBody>
       </p:sp>
@@ -28356,7 +28560,12 @@
             <p:ph sz="quarter" idx="19"/>
           </p:nvPr>
         </p:nvSpPr>
-        <p:spPr/>
+        <p:spPr>
+          <a:xfrm>
+            <a:off x="8152474" y="1807250"/>
+            <a:ext cx="3628711" cy="5099635"/>
+          </a:xfrm>
+        </p:spPr>
         <p:txBody>
           <a:bodyPr/>
           <a:lstStyle/>
@@ -28550,7 +28759,15 @@
             </a:r>
             <a:r>
               <a:rPr lang="es-ES" dirty="0"/>
-              <a:t> as son as </a:t>
+              <a:t> as </a:t>
+            </a:r>
+            <a:r>
+              <a:rPr lang="es-ES" dirty="0" err="1"/>
+              <a:t>soon</a:t>
+            </a:r>
+            <a:r>
+              <a:rPr lang="es-ES" dirty="0"/>
+              <a:t> as </a:t>
             </a:r>
             <a:r>
               <a:rPr lang="es-ES" dirty="0" err="1"/>
@@ -28615,7 +28832,12 @@
             <p:ph sz="quarter" idx="18"/>
           </p:nvPr>
         </p:nvSpPr>
-        <p:spPr/>
+        <p:spPr>
+          <a:xfrm>
+            <a:off x="4268787" y="1807250"/>
+            <a:ext cx="3628711" cy="5099635"/>
+          </a:xfrm>
+        </p:spPr>
         <p:txBody>
           <a:bodyPr/>
           <a:lstStyle/>
@@ -28746,7 +28968,7 @@
         </p:nvSpPr>
         <p:spPr>
           <a:xfrm>
-            <a:off x="385100" y="1005890"/>
+            <a:off x="385100" y="1816775"/>
             <a:ext cx="3628711" cy="5099635"/>
           </a:xfrm>
         </p:spPr>
@@ -28919,7 +29141,7 @@
         </p:nvSpPr>
         <p:spPr>
           <a:xfrm>
-            <a:off x="385099" y="3546182"/>
+            <a:off x="385099" y="4357067"/>
             <a:ext cx="11806901" cy="5099635"/>
           </a:xfrm>
           <a:prstGeom prst="rect">
@@ -29145,6 +29367,49 @@
           </a:p>
         </p:txBody>
       </p:sp>
+      <p:sp>
+        <p:nvSpPr>
+          <p:cNvPr id="9" name="Rectangle 8">
+            <a:extLst>
+              <a:ext uri="{FF2B5EF4-FFF2-40B4-BE49-F238E27FC236}">
+                <a16:creationId xmlns:a16="http://schemas.microsoft.com/office/drawing/2014/main" id="{EF450983-7B3A-4EE5-AA02-711ED14DDE02}"/>
+              </a:ext>
+            </a:extLst>
+          </p:cNvPr>
+          <p:cNvSpPr/>
+          <p:nvPr/>
+        </p:nvSpPr>
+        <p:spPr>
+          <a:xfrm>
+            <a:off x="304993" y="1031648"/>
+            <a:ext cx="11476192" cy="400110"/>
+          </a:xfrm>
+          <a:prstGeom prst="rect">
+            <a:avLst/>
+          </a:prstGeom>
+        </p:spPr>
+        <p:txBody>
+          <a:bodyPr wrap="square">
+            <a:spAutoFit/>
+          </a:bodyPr>
+          <a:lstStyle/>
+          <a:p>
+            <a:r>
+              <a:rPr lang="en-US" sz="2000" dirty="0">
+                <a:solidFill>
+                  <a:schemeClr val="bg1"/>
+                </a:solidFill>
+              </a:rPr>
+              <a:t>-     What is JAM? Stands for JavaScript, APIs and Markdown (compiled).</a:t>
+            </a:r>
+            <a:endParaRPr lang="es-ES" sz="2000" dirty="0">
+              <a:solidFill>
+                <a:schemeClr val="bg1"/>
+              </a:solidFill>
+            </a:endParaRPr>
+          </a:p>
+        </p:txBody>
+      </p:sp>
     </p:spTree>
     <p:extLst>
       <p:ext uri="{BB962C8B-B14F-4D97-AF65-F5344CB8AC3E}">
@@ -29210,8 +29475,13 @@
           <a:p>
             <a:r>
               <a:rPr lang="es-ES" dirty="0"/>
-              <a:t>MVC and MVVM</a:t>
-            </a:r>
+              <a:t>MVC and MVVM </a:t>
+            </a:r>
+            <a:r>
+              <a:rPr lang="es-ES" dirty="0" err="1"/>
+              <a:t>trends</a:t>
+            </a:r>
+            <a:endParaRPr lang="es-ES" dirty="0"/>
           </a:p>
         </p:txBody>
       </p:sp>
@@ -31857,7 +32127,15 @@
             </a:r>
             <a:r>
               <a:rPr lang="es-ES" dirty="0"/>
-              <a:t> as son as </a:t>
+              <a:t> as </a:t>
+            </a:r>
+            <a:r>
+              <a:rPr lang="es-ES" dirty="0" err="1"/>
+              <a:t>soon</a:t>
+            </a:r>
+            <a:r>
+              <a:rPr lang="es-ES" dirty="0"/>
+              <a:t> as </a:t>
             </a:r>
             <a:r>
               <a:rPr lang="es-ES" dirty="0" err="1"/>
@@ -32500,7 +32778,7 @@
         <p:spPr>
           <a:xfrm>
             <a:off x="385100" y="4308182"/>
-            <a:ext cx="4831793" cy="5099635"/>
+            <a:ext cx="11396085" cy="5099635"/>
           </a:xfrm>
           <a:prstGeom prst="rect">
             <a:avLst/>
@@ -34342,6 +34620,21 @@
 </file>
 
 <file path=customXml/item1.xml><?xml version="1.0" encoding="utf-8"?>
+<p:properties xmlns:p="http://schemas.microsoft.com/office/2006/metadata/properties" xmlns:xsi="http://www.w3.org/2001/XMLSchema-instance" xmlns:pc="http://schemas.microsoft.com/office/infopath/2007/PartnerControls">
+  <documentManagement/>
+</p:properties>
+</file>
+
+<file path=customXml/item2.xml><?xml version="1.0" encoding="utf-8"?>
+<?mso-contentType ?>
+<FormTemplates xmlns="http://schemas.microsoft.com/sharepoint/v3/contenttype/forms">
+  <Display>DocumentLibraryForm</Display>
+  <Edit>DocumentLibraryForm</Edit>
+  <New>DocumentLibraryForm</New>
+</FormTemplates>
+</file>
+
+<file path=customXml/item3.xml><?xml version="1.0" encoding="utf-8"?>
 <ct:contentTypeSchema xmlns:ct="http://schemas.microsoft.com/office/2006/metadata/contentType" xmlns:ma="http://schemas.microsoft.com/office/2006/metadata/properties/metaAttributes" ct:_="" ma:_="" ma:contentTypeName="Document" ma:contentTypeID="0x0101001B3BE08D3416C348A72123B6EAAFED42" ma:contentTypeVersion="13" ma:contentTypeDescription="Create a new document." ma:contentTypeScope="" ma:versionID="9a1c3d312980ce91288f8a281cc754d2">
   <xsd:schema xmlns:xsd="http://www.w3.org/2001/XMLSchema" xmlns:xs="http://www.w3.org/2001/XMLSchema" xmlns:p="http://schemas.microsoft.com/office/2006/metadata/properties" xmlns:ns3="bfe5b6d5-f74c-4552-82e4-e4793e7fbdad" xmlns:ns4="4c4a9a5d-2512-4496-ba5e-c8af85430488" targetNamespace="http://schemas.microsoft.com/office/2006/metadata/properties" ma:root="true" ma:fieldsID="d7661895fc09a9f1723b08231e285b7d" ns3:_="" ns4:_="">
     <xsd:import namespace="bfe5b6d5-f74c-4552-82e4-e4793e7fbdad"/>
@@ -34564,22 +34857,32 @@
 </ct:contentTypeSchema>
 </file>
 
-<file path=customXml/item2.xml><?xml version="1.0" encoding="utf-8"?>
-<?mso-contentType ?>
-<FormTemplates xmlns="http://schemas.microsoft.com/sharepoint/v3/contenttype/forms">
-  <Display>DocumentLibraryForm</Display>
-  <Edit>DocumentLibraryForm</Edit>
-  <New>DocumentLibraryForm</New>
-</FormTemplates>
+<file path=customXml/itemProps1.xml><?xml version="1.0" encoding="utf-8"?>
+<ds:datastoreItem xmlns:ds="http://schemas.openxmlformats.org/officeDocument/2006/customXml" ds:itemID="{03A3D432-67D8-4593-A37C-AEB7E52351BA}">
+  <ds:schemaRefs>
+    <ds:schemaRef ds:uri="http://purl.org/dc/elements/1.1/"/>
+    <ds:schemaRef ds:uri="http://purl.org/dc/dcmitype/"/>
+    <ds:schemaRef ds:uri="http://schemas.microsoft.com/office/2006/metadata/properties"/>
+    <ds:schemaRef ds:uri="4c4a9a5d-2512-4496-ba5e-c8af85430488"/>
+    <ds:schemaRef ds:uri="http://www.w3.org/XML/1998/namespace"/>
+    <ds:schemaRef ds:uri="http://schemas.microsoft.com/office/infopath/2007/PartnerControls"/>
+    <ds:schemaRef ds:uri="http://schemas.microsoft.com/office/2006/documentManagement/types"/>
+    <ds:schemaRef ds:uri="http://schemas.openxmlformats.org/package/2006/metadata/core-properties"/>
+    <ds:schemaRef ds:uri="bfe5b6d5-f74c-4552-82e4-e4793e7fbdad"/>
+    <ds:schemaRef ds:uri="http://purl.org/dc/terms/"/>
+  </ds:schemaRefs>
+</ds:datastoreItem>
 </file>
 
-<file path=customXml/item3.xml><?xml version="1.0" encoding="utf-8"?>
-<p:properties xmlns:p="http://schemas.microsoft.com/office/2006/metadata/properties" xmlns:xsi="http://www.w3.org/2001/XMLSchema-instance" xmlns:pc="http://schemas.microsoft.com/office/infopath/2007/PartnerControls">
-  <documentManagement/>
-</p:properties>
+<file path=customXml/itemProps2.xml><?xml version="1.0" encoding="utf-8"?>
+<ds:datastoreItem xmlns:ds="http://schemas.openxmlformats.org/officeDocument/2006/customXml" ds:itemID="{4A3B3CC2-0F26-474C-A106-55BE6EB43FF7}">
+  <ds:schemaRefs>
+    <ds:schemaRef ds:uri="http://schemas.microsoft.com/sharepoint/v3/contenttype/forms"/>
+  </ds:schemaRefs>
+</ds:datastoreItem>
 </file>
 
-<file path=customXml/itemProps1.xml><?xml version="1.0" encoding="utf-8"?>
+<file path=customXml/itemProps3.xml><?xml version="1.0" encoding="utf-8"?>
 <ds:datastoreItem xmlns:ds="http://schemas.openxmlformats.org/officeDocument/2006/customXml" ds:itemID="{2A199154-8530-4597-B8B9-8681028ACFC3}">
   <ds:schemaRefs>
     <ds:schemaRef ds:uri="http://schemas.microsoft.com/office/2006/metadata/contentType"/>
@@ -34596,29 +34899,4 @@
     <ds:schemaRef ds:uri="http://schemas.microsoft.com/internal/obd"/>
   </ds:schemaRefs>
 </ds:datastoreItem>
-</file>
-
-<file path=customXml/itemProps2.xml><?xml version="1.0" encoding="utf-8"?>
-<ds:datastoreItem xmlns:ds="http://schemas.openxmlformats.org/officeDocument/2006/customXml" ds:itemID="{4A3B3CC2-0F26-474C-A106-55BE6EB43FF7}">
-  <ds:schemaRefs>
-    <ds:schemaRef ds:uri="http://schemas.microsoft.com/sharepoint/v3/contenttype/forms"/>
-  </ds:schemaRefs>
-</ds:datastoreItem>
-</file>
-
-<file path=customXml/itemProps3.xml><?xml version="1.0" encoding="utf-8"?>
-<ds:datastoreItem xmlns:ds="http://schemas.openxmlformats.org/officeDocument/2006/customXml" ds:itemID="{03A3D432-67D8-4593-A37C-AEB7E52351BA}">
-  <ds:schemaRefs>
-    <ds:schemaRef ds:uri="http://schemas.openxmlformats.org/package/2006/metadata/core-properties"/>
-    <ds:schemaRef ds:uri="http://purl.org/dc/elements/1.1/"/>
-    <ds:schemaRef ds:uri="4c4a9a5d-2512-4496-ba5e-c8af85430488"/>
-    <ds:schemaRef ds:uri="http://schemas.microsoft.com/office/2006/documentManagement/types"/>
-    <ds:schemaRef ds:uri="http://schemas.microsoft.com/office/infopath/2007/PartnerControls"/>
-    <ds:schemaRef ds:uri="http://schemas.microsoft.com/office/2006/metadata/properties"/>
-    <ds:schemaRef ds:uri="http://purl.org/dc/dcmitype/"/>
-    <ds:schemaRef ds:uri="bfe5b6d5-f74c-4552-82e4-e4793e7fbdad"/>
-    <ds:schemaRef ds:uri="http://www.w3.org/XML/1998/namespace"/>
-    <ds:schemaRef ds:uri="http://purl.org/dc/terms/"/>
-  </ds:schemaRefs>
-</ds:datastoreItem>
 </file>
</xml_diff>